<commit_message>
added Horton's 2/15 live slides, fixed readings typo on closest pair
</commit_message>
<xml_diff>
--- a/slides/closestpair_quicksort.pptx
+++ b/slides/closestpair_quicksort.pptx
@@ -5065,7 +5065,7 @@
             <a:fld id="{7AA5AD8F-F3B0-42A1-BADE-3E121779D997}" type="datetime1">
               <a:rPr lang="en-US" smtClean="0"/>
               <a:pPr/>
-              <a:t>2/8/21</a:t>
+              <a:t>2/15/21</a:t>
             </a:fld>
             <a:endParaRPr lang="en-US"/>
           </a:p>
@@ -5425,7 +5425,7 @@
             <a:fld id="{70B371D5-F170-4574-829E-67713AA2AF8B}" type="datetime1">
               <a:rPr lang="en-US" smtClean="0"/>
               <a:pPr/>
-              <a:t>2/8/21</a:t>
+              <a:t>2/15/21</a:t>
             </a:fld>
             <a:endParaRPr lang="en-US"/>
           </a:p>
@@ -5601,7 +5601,7 @@
             <a:fld id="{41DEAF00-D1FE-4F71-8891-85EEE31B7478}" type="datetime1">
               <a:rPr lang="en-US" smtClean="0"/>
               <a:pPr/>
-              <a:t>2/8/21</a:t>
+              <a:t>2/15/21</a:t>
             </a:fld>
             <a:endParaRPr lang="en-US"/>
           </a:p>
@@ -5918,7 +5918,7 @@
             <a:fld id="{94B9C8BD-ED75-4439-AD6B-9DD62AAFC8D9}" type="datetime1">
               <a:rPr lang="en-US" smtClean="0"/>
               <a:pPr/>
-              <a:t>2/8/21</a:t>
+              <a:t>2/15/21</a:t>
             </a:fld>
             <a:endParaRPr lang="en-US"/>
           </a:p>
@@ -6219,7 +6219,7 @@
             <a:fld id="{ECD93607-5884-4A96-A08B-80229D166DF1}" type="datetime1">
               <a:rPr lang="en-US" smtClean="0"/>
               <a:pPr/>
-              <a:t>2/8/21</a:t>
+              <a:t>2/15/21</a:t>
             </a:fld>
             <a:endParaRPr lang="en-US"/>
           </a:p>
@@ -6440,7 +6440,7 @@
             <a:fld id="{6F102B80-C461-45FB-9371-DFC9B0CCC0E5}" type="datetime1">
               <a:rPr lang="en-US" smtClean="0"/>
               <a:pPr/>
-              <a:t>2/8/21</a:t>
+              <a:t>2/15/21</a:t>
             </a:fld>
             <a:endParaRPr lang="en-US"/>
           </a:p>
@@ -6855,7 +6855,7 @@
             <a:fld id="{EA9CD99D-5207-446B-9DC5-D0DDD2D44051}" type="datetime1">
               <a:rPr lang="en-US" smtClean="0"/>
               <a:pPr/>
-              <a:t>2/8/21</a:t>
+              <a:t>2/15/21</a:t>
             </a:fld>
             <a:endParaRPr lang="en-US"/>
           </a:p>
@@ -7088,7 +7088,7 @@
             <a:fld id="{72673F1E-8F53-44C8-9921-41D9D265AD14}" type="datetime1">
               <a:rPr lang="en-US" smtClean="0"/>
               <a:pPr/>
-              <a:t>2/8/21</a:t>
+              <a:t>2/15/21</a:t>
             </a:fld>
             <a:endParaRPr lang="en-US"/>
           </a:p>
@@ -7230,7 +7230,7 @@
             <a:fld id="{E298527C-C606-48C4-B4D5-2567D6898083}" type="datetime1">
               <a:rPr lang="en-US" smtClean="0"/>
               <a:pPr/>
-              <a:t>2/8/21</a:t>
+              <a:t>2/15/21</a:t>
             </a:fld>
             <a:endParaRPr lang="en-US"/>
           </a:p>
@@ -7508,7 +7508,7 @@
             <a:fld id="{1539330C-42EA-483B-AECF-1BED7029D168}" type="datetime1">
               <a:rPr lang="en-US" smtClean="0"/>
               <a:pPr/>
-              <a:t>2/8/21</a:t>
+              <a:t>2/15/21</a:t>
             </a:fld>
             <a:endParaRPr lang="en-US"/>
           </a:p>
@@ -7916,7 +7916,7 @@
             <a:fld id="{6164C552-CBA0-44FF-B21C-CCB2A0CE4F32}" type="datetime1">
               <a:rPr lang="en-US" smtClean="0"/>
               <a:pPr/>
-              <a:t>2/8/21</a:t>
+              <a:t>2/15/21</a:t>
             </a:fld>
             <a:endParaRPr lang="en-US"/>
           </a:p>
@@ -8255,7 +8255,7 @@
             <a:fld id="{616F3C91-9847-4E06-A788-F916DE9E864B}" type="datetime1">
               <a:rPr lang="en-US" smtClean="0"/>
               <a:pPr/>
-              <a:t>2/8/21</a:t>
+              <a:t>2/15/21</a:t>
             </a:fld>
             <a:endParaRPr lang="en-US"/>
           </a:p>
@@ -8887,7 +8887,7 @@
             </a:extLst>
           </p:cNvPr>
           <p:cNvSpPr>
-            <a:spLocks noChangeArrowheads="1"/>
+            <a:spLocks noGrp="1" noChangeArrowheads="1"/>
           </p:cNvSpPr>
           <p:nvPr>
             <p:ph type="body" idx="1"/>
@@ -9742,7 +9742,7 @@
           <a:graphicData uri="http://schemas.openxmlformats.org/presentationml/2006/ole">
             <mc:AlternateContent xmlns:mc="http://schemas.openxmlformats.org/markup-compatibility/2006">
               <mc:Choice xmlns:v="urn:schemas-microsoft-com:vml" Requires="v">
-                <p:oleObj spid="_x0000_s57355" name="Equation" r:id="rId6" imgW="1574800" imgH="444500" progId="Equation.3">
+                <p:oleObj spid="_x0000_s57356" name="Equation" r:id="rId6" imgW="1574800" imgH="444500" progId="Equation.3">
                   <p:embed/>
                 </p:oleObj>
               </mc:Choice>
@@ -11688,24 +11688,24 @@
           </a:bodyPr>
           <a:lstStyle/>
           <a:p>
-            <a:pPr marL="0" indent="0" rtl="0" eaLnBrk="1" latinLnBrk="0" hangingPunct="1">
-              <a:spcBef>
-                <a:spcPts val="600"/>
-              </a:spcBef>
-              <a:buClr>
-                <a:schemeClr val="accent1"/>
-              </a:buClr>
-              <a:buSzPct val="76000"/>
-              <a:buFont typeface="Wingdings 3"/>
-              <a:buNone/>
-            </a:pPr>
             <a:r>
               <a:rPr lang="en-US" sz="2400" dirty="0">
                 <a:latin typeface="Calibri" panose="020F0502020204030204" pitchFamily="34" charset="0"/>
                 <a:cs typeface="Calibri" panose="020F0502020204030204" pitchFamily="34" charset="0"/>
               </a:rPr>
-              <a:t>Readings: CLRS Chapter 7 (not 7.4.2)</a:t>
-            </a:r>
+              <a:t>Readings: </a:t>
+            </a:r>
+            <a:r>
+              <a:rPr lang="en-US" sz="2400">
+                <a:latin typeface="Calibri" panose="020F0502020204030204" pitchFamily="34" charset="0"/>
+                <a:cs typeface="Calibri" panose="020F0502020204030204" pitchFamily="34" charset="0"/>
+              </a:rPr>
+              <a:t>CLRS 33.4</a:t>
+            </a:r>
+            <a:endParaRPr lang="en-US" sz="2400" dirty="0">
+              <a:latin typeface="Calibri" panose="020F0502020204030204" pitchFamily="34" charset="0"/>
+              <a:cs typeface="Calibri" panose="020F0502020204030204" pitchFamily="34" charset="0"/>
+            </a:endParaRPr>
           </a:p>
         </p:txBody>
       </p:sp>
@@ -13418,8 +13418,8 @@
           </p:style>
         </p:cxnSp>
       </p:grpSp>
-      <mc:AlternateContent xmlns:mc="http://schemas.openxmlformats.org/markup-compatibility/2006">
-        <mc:Choice xmlns:a14="http://schemas.microsoft.com/office/drawing/2010/main" Requires="a14">
+      <mc:AlternateContent xmlns:mc="http://schemas.openxmlformats.org/markup-compatibility/2006" xmlns:a14="http://schemas.microsoft.com/office/drawing/2010/main">
+        <mc:Choice Requires="a14">
           <p:sp>
             <p:nvSpPr>
               <p:cNvPr id="38" name="TextBox 37"/>
@@ -13522,7 +13522,7 @@
             </p:txBody>
           </p:sp>
         </mc:Choice>
-        <mc:Fallback>
+        <mc:Fallback xmlns="">
           <p:sp>
             <p:nvSpPr>
               <p:cNvPr id="38" name="TextBox 37"/>
@@ -13600,8 +13600,8 @@
           </a:p>
         </p:txBody>
       </p:sp>
-      <mc:AlternateContent xmlns:mc="http://schemas.openxmlformats.org/markup-compatibility/2006">
-        <mc:Choice xmlns:a14="http://schemas.microsoft.com/office/drawing/2010/main" Requires="a14">
+      <mc:AlternateContent xmlns:mc="http://schemas.openxmlformats.org/markup-compatibility/2006" xmlns:a14="http://schemas.microsoft.com/office/drawing/2010/main">
+        <mc:Choice Requires="a14">
           <p:sp>
             <p:nvSpPr>
               <p:cNvPr id="26" name="TextBox 25">
@@ -13725,7 +13725,7 @@
             </p:txBody>
           </p:sp>
         </mc:Choice>
-        <mc:Fallback>
+        <mc:Fallback xmlns="">
           <p:sp>
             <p:nvSpPr>
               <p:cNvPr id="26" name="TextBox 25">
@@ -19888,8 +19888,8 @@
           </a:p>
         </p:txBody>
       </p:sp>
-      <mc:AlternateContent xmlns:mc="http://schemas.openxmlformats.org/markup-compatibility/2006">
-        <mc:Choice xmlns:a14="http://schemas.microsoft.com/office/drawing/2010/main" Requires="a14">
+      <mc:AlternateContent xmlns:mc="http://schemas.openxmlformats.org/markup-compatibility/2006" xmlns:a14="http://schemas.microsoft.com/office/drawing/2010/main">
+        <mc:Choice Requires="a14">
           <p:sp>
             <p:nvSpPr>
               <p:cNvPr id="33" name="TextBox 32"/>
@@ -19965,7 +19965,7 @@
             </p:txBody>
           </p:sp>
         </mc:Choice>
-        <mc:Fallback>
+        <mc:Fallback xmlns="">
           <p:sp>
             <p:nvSpPr>
               <p:cNvPr id="33" name="TextBox 32"/>
@@ -20004,8 +20004,8 @@
           </p:sp>
         </mc:Fallback>
       </mc:AlternateContent>
-      <mc:AlternateContent xmlns:mc="http://schemas.openxmlformats.org/markup-compatibility/2006">
-        <mc:Choice xmlns:a14="http://schemas.microsoft.com/office/drawing/2010/main" Requires="a14">
+      <mc:AlternateContent xmlns:mc="http://schemas.openxmlformats.org/markup-compatibility/2006" xmlns:a14="http://schemas.microsoft.com/office/drawing/2010/main">
+        <mc:Choice Requires="a14">
           <p:sp>
             <p:nvSpPr>
               <p:cNvPr id="34" name="TextBox 33"/>
@@ -20081,7 +20081,7 @@
             </p:txBody>
           </p:sp>
         </mc:Choice>
-        <mc:Fallback>
+        <mc:Fallback xmlns="">
           <p:sp>
             <p:nvSpPr>
               <p:cNvPr id="34" name="TextBox 33"/>
@@ -20120,8 +20120,8 @@
           </p:sp>
         </mc:Fallback>
       </mc:AlternateContent>
-      <mc:AlternateContent xmlns:mc="http://schemas.openxmlformats.org/markup-compatibility/2006">
-        <mc:Choice xmlns:a14="http://schemas.microsoft.com/office/drawing/2010/main" Requires="a14">
+      <mc:AlternateContent xmlns:mc="http://schemas.openxmlformats.org/markup-compatibility/2006" xmlns:a14="http://schemas.microsoft.com/office/drawing/2010/main">
+        <mc:Choice Requires="a14">
           <p:sp>
             <p:nvSpPr>
               <p:cNvPr id="35" name="TextBox 34"/>
@@ -20270,7 +20270,7 @@
             </p:txBody>
           </p:sp>
         </mc:Choice>
-        <mc:Fallback>
+        <mc:Fallback xmlns="">
           <p:sp>
             <p:nvSpPr>
               <p:cNvPr id="35" name="TextBox 34"/>
@@ -20397,8 +20397,8 @@
           </a:fontRef>
         </p:style>
       </p:cxnSp>
-      <mc:AlternateContent xmlns:mc="http://schemas.openxmlformats.org/markup-compatibility/2006">
-        <mc:Choice xmlns:a14="http://schemas.microsoft.com/office/drawing/2010/main" Requires="a14">
+      <mc:AlternateContent xmlns:mc="http://schemas.openxmlformats.org/markup-compatibility/2006" xmlns:a14="http://schemas.microsoft.com/office/drawing/2010/main">
+        <mc:Choice Requires="a14">
           <p:sp>
             <p:nvSpPr>
               <p:cNvPr id="37" name="TextBox 36"/>
@@ -20452,7 +20452,7 @@
             </p:txBody>
           </p:sp>
         </mc:Choice>
-        <mc:Fallback>
+        <mc:Fallback xmlns="">
           <p:sp>
             <p:nvSpPr>
               <p:cNvPr id="37" name="TextBox 36"/>
@@ -21867,8 +21867,8 @@
           </a:p>
         </p:txBody>
       </p:sp>
-      <mc:AlternateContent xmlns:mc="http://schemas.openxmlformats.org/markup-compatibility/2006">
-        <mc:Choice xmlns:a14="http://schemas.microsoft.com/office/drawing/2010/main" Requires="a14">
+      <mc:AlternateContent xmlns:mc="http://schemas.openxmlformats.org/markup-compatibility/2006" xmlns:a14="http://schemas.microsoft.com/office/drawing/2010/main">
+        <mc:Choice Requires="a14">
           <p:sp>
             <p:nvSpPr>
               <p:cNvPr id="33" name="TextBox 32"/>
@@ -21944,7 +21944,7 @@
             </p:txBody>
           </p:sp>
         </mc:Choice>
-        <mc:Fallback>
+        <mc:Fallback xmlns="">
           <p:sp>
             <p:nvSpPr>
               <p:cNvPr id="33" name="TextBox 32"/>
@@ -21983,8 +21983,8 @@
           </p:sp>
         </mc:Fallback>
       </mc:AlternateContent>
-      <mc:AlternateContent xmlns:mc="http://schemas.openxmlformats.org/markup-compatibility/2006">
-        <mc:Choice xmlns:a14="http://schemas.microsoft.com/office/drawing/2010/main" Requires="a14">
+      <mc:AlternateContent xmlns:mc="http://schemas.openxmlformats.org/markup-compatibility/2006" xmlns:a14="http://schemas.microsoft.com/office/drawing/2010/main">
+        <mc:Choice Requires="a14">
           <p:sp>
             <p:nvSpPr>
               <p:cNvPr id="34" name="TextBox 33"/>
@@ -22060,7 +22060,7 @@
             </p:txBody>
           </p:sp>
         </mc:Choice>
-        <mc:Fallback>
+        <mc:Fallback xmlns="">
           <p:sp>
             <p:nvSpPr>
               <p:cNvPr id="34" name="TextBox 33"/>
@@ -22187,8 +22187,8 @@
           </a:fontRef>
         </p:style>
       </p:cxnSp>
-      <mc:AlternateContent xmlns:mc="http://schemas.openxmlformats.org/markup-compatibility/2006">
-        <mc:Choice xmlns:a14="http://schemas.microsoft.com/office/drawing/2010/main" Requires="a14">
+      <mc:AlternateContent xmlns:mc="http://schemas.openxmlformats.org/markup-compatibility/2006" xmlns:a14="http://schemas.microsoft.com/office/drawing/2010/main">
+        <mc:Choice Requires="a14">
           <p:sp>
             <p:nvSpPr>
               <p:cNvPr id="37" name="TextBox 36"/>
@@ -22242,7 +22242,7 @@
             </p:txBody>
           </p:sp>
         </mc:Choice>
-        <mc:Fallback>
+        <mc:Fallback xmlns="">
           <p:sp>
             <p:nvSpPr>
               <p:cNvPr id="37" name="TextBox 36"/>
@@ -22281,8 +22281,8 @@
           </p:sp>
         </mc:Fallback>
       </mc:AlternateContent>
-      <mc:AlternateContent xmlns:mc="http://schemas.openxmlformats.org/markup-compatibility/2006">
-        <mc:Choice xmlns:a14="http://schemas.microsoft.com/office/drawing/2010/main" Requires="a14">
+      <mc:AlternateContent xmlns:mc="http://schemas.openxmlformats.org/markup-compatibility/2006" xmlns:a14="http://schemas.microsoft.com/office/drawing/2010/main">
+        <mc:Choice Requires="a14">
           <p:sp>
             <p:nvSpPr>
               <p:cNvPr id="28" name="TextBox 27"/>
@@ -22410,7 +22410,7 @@
             </p:txBody>
           </p:sp>
         </mc:Choice>
-        <mc:Fallback>
+        <mc:Fallback xmlns="">
           <p:sp>
             <p:nvSpPr>
               <p:cNvPr id="28" name="TextBox 27"/>
@@ -22478,8 +22478,8 @@
           </a:p>
         </p:txBody>
       </p:sp>
-      <mc:AlternateContent xmlns:mc="http://schemas.openxmlformats.org/markup-compatibility/2006">
-        <mc:Choice xmlns:a14="http://schemas.microsoft.com/office/drawing/2010/main" Requires="a14">
+      <mc:AlternateContent xmlns:mc="http://schemas.openxmlformats.org/markup-compatibility/2006" xmlns:a14="http://schemas.microsoft.com/office/drawing/2010/main">
+        <mc:Choice Requires="a14">
           <p:sp>
             <p:nvSpPr>
               <p:cNvPr id="5" name="TextBox 4"/>
@@ -22710,7 +22710,7 @@
             </p:txBody>
           </p:sp>
         </mc:Choice>
-        <mc:Fallback>
+        <mc:Fallback xmlns="">
           <p:sp>
             <p:nvSpPr>
               <p:cNvPr id="5" name="TextBox 4"/>
@@ -22875,8 +22875,8 @@
           </a:p>
         </p:txBody>
       </p:sp>
-      <mc:AlternateContent xmlns:mc="http://schemas.openxmlformats.org/markup-compatibility/2006">
-        <mc:Choice xmlns:a14="http://schemas.microsoft.com/office/drawing/2010/main" Requires="a14">
+      <mc:AlternateContent xmlns:mc="http://schemas.openxmlformats.org/markup-compatibility/2006" xmlns:a14="http://schemas.microsoft.com/office/drawing/2010/main">
+        <mc:Choice Requires="a14">
           <p:sp>
             <p:nvSpPr>
               <p:cNvPr id="35" name="TextBox 34">
@@ -22990,7 +22990,7 @@
             </p:txBody>
           </p:sp>
         </mc:Choice>
-        <mc:Fallback>
+        <mc:Fallback xmlns="">
           <p:sp>
             <p:nvSpPr>
               <p:cNvPr id="35" name="TextBox 34">
@@ -24041,8 +24041,8 @@
           </a:p>
         </p:txBody>
       </p:sp>
-      <mc:AlternateContent xmlns:mc="http://schemas.openxmlformats.org/markup-compatibility/2006">
-        <mc:Choice xmlns:a14="http://schemas.microsoft.com/office/drawing/2010/main" Requires="a14">
+      <mc:AlternateContent xmlns:mc="http://schemas.openxmlformats.org/markup-compatibility/2006" xmlns:a14="http://schemas.microsoft.com/office/drawing/2010/main">
+        <mc:Choice Requires="a14">
           <p:sp>
             <p:nvSpPr>
               <p:cNvPr id="33" name="TextBox 32"/>
@@ -24118,7 +24118,7 @@
             </p:txBody>
           </p:sp>
         </mc:Choice>
-        <mc:Fallback>
+        <mc:Fallback xmlns="">
           <p:sp>
             <p:nvSpPr>
               <p:cNvPr id="33" name="TextBox 32"/>
@@ -24157,8 +24157,8 @@
           </p:sp>
         </mc:Fallback>
       </mc:AlternateContent>
-      <mc:AlternateContent xmlns:mc="http://schemas.openxmlformats.org/markup-compatibility/2006">
-        <mc:Choice xmlns:a14="http://schemas.microsoft.com/office/drawing/2010/main" Requires="a14">
+      <mc:AlternateContent xmlns:mc="http://schemas.openxmlformats.org/markup-compatibility/2006" xmlns:a14="http://schemas.microsoft.com/office/drawing/2010/main">
+        <mc:Choice Requires="a14">
           <p:sp>
             <p:nvSpPr>
               <p:cNvPr id="34" name="TextBox 33"/>
@@ -24234,7 +24234,7 @@
             </p:txBody>
           </p:sp>
         </mc:Choice>
-        <mc:Fallback>
+        <mc:Fallback xmlns="">
           <p:sp>
             <p:nvSpPr>
               <p:cNvPr id="34" name="TextBox 33"/>
@@ -24361,8 +24361,8 @@
           </a:fontRef>
         </p:style>
       </p:cxnSp>
-      <mc:AlternateContent xmlns:mc="http://schemas.openxmlformats.org/markup-compatibility/2006">
-        <mc:Choice xmlns:a14="http://schemas.microsoft.com/office/drawing/2010/main" Requires="a14">
+      <mc:AlternateContent xmlns:mc="http://schemas.openxmlformats.org/markup-compatibility/2006" xmlns:a14="http://schemas.microsoft.com/office/drawing/2010/main">
+        <mc:Choice Requires="a14">
           <p:sp>
             <p:nvSpPr>
               <p:cNvPr id="37" name="TextBox 36"/>
@@ -24416,7 +24416,7 @@
             </p:txBody>
           </p:sp>
         </mc:Choice>
-        <mc:Fallback>
+        <mc:Fallback xmlns="">
           <p:sp>
             <p:nvSpPr>
               <p:cNvPr id="37" name="TextBox 36"/>
@@ -24484,8 +24484,8 @@
           </a:p>
         </p:txBody>
       </p:sp>
-      <mc:AlternateContent xmlns:mc="http://schemas.openxmlformats.org/markup-compatibility/2006">
-        <mc:Choice xmlns:a14="http://schemas.microsoft.com/office/drawing/2010/main" Requires="a14">
+      <mc:AlternateContent xmlns:mc="http://schemas.openxmlformats.org/markup-compatibility/2006" xmlns:a14="http://schemas.microsoft.com/office/drawing/2010/main">
+        <mc:Choice Requires="a14">
           <p:sp>
             <p:nvSpPr>
               <p:cNvPr id="35" name="TextBox 34"/>
@@ -24530,7 +24530,7 @@
             </p:txBody>
           </p:sp>
         </mc:Choice>
-        <mc:Fallback>
+        <mc:Fallback xmlns="">
           <p:sp>
             <p:nvSpPr>
               <p:cNvPr id="35" name="TextBox 34"/>
@@ -25583,8 +25583,8 @@
           </a:p>
         </p:txBody>
       </p:sp>
-      <mc:AlternateContent xmlns:mc="http://schemas.openxmlformats.org/markup-compatibility/2006">
-        <mc:Choice xmlns:a14="http://schemas.microsoft.com/office/drawing/2010/main" Requires="a14">
+      <mc:AlternateContent xmlns:mc="http://schemas.openxmlformats.org/markup-compatibility/2006" xmlns:a14="http://schemas.microsoft.com/office/drawing/2010/main">
+        <mc:Choice Requires="a14">
           <p:sp>
             <p:nvSpPr>
               <p:cNvPr id="33" name="TextBox 32"/>
@@ -25660,7 +25660,7 @@
             </p:txBody>
           </p:sp>
         </mc:Choice>
-        <mc:Fallback>
+        <mc:Fallback xmlns="">
           <p:sp>
             <p:nvSpPr>
               <p:cNvPr id="33" name="TextBox 32"/>
@@ -25699,8 +25699,8 @@
           </p:sp>
         </mc:Fallback>
       </mc:AlternateContent>
-      <mc:AlternateContent xmlns:mc="http://schemas.openxmlformats.org/markup-compatibility/2006">
-        <mc:Choice xmlns:a14="http://schemas.microsoft.com/office/drawing/2010/main" Requires="a14">
+      <mc:AlternateContent xmlns:mc="http://schemas.openxmlformats.org/markup-compatibility/2006" xmlns:a14="http://schemas.microsoft.com/office/drawing/2010/main">
+        <mc:Choice Requires="a14">
           <p:sp>
             <p:nvSpPr>
               <p:cNvPr id="34" name="TextBox 33"/>
@@ -25776,7 +25776,7 @@
             </p:txBody>
           </p:sp>
         </mc:Choice>
-        <mc:Fallback>
+        <mc:Fallback xmlns="">
           <p:sp>
             <p:nvSpPr>
               <p:cNvPr id="34" name="TextBox 33"/>
@@ -25903,8 +25903,8 @@
           </a:fontRef>
         </p:style>
       </p:cxnSp>
-      <mc:AlternateContent xmlns:mc="http://schemas.openxmlformats.org/markup-compatibility/2006">
-        <mc:Choice xmlns:a14="http://schemas.microsoft.com/office/drawing/2010/main" Requires="a14">
+      <mc:AlternateContent xmlns:mc="http://schemas.openxmlformats.org/markup-compatibility/2006" xmlns:a14="http://schemas.microsoft.com/office/drawing/2010/main">
+        <mc:Choice Requires="a14">
           <p:sp>
             <p:nvSpPr>
               <p:cNvPr id="37" name="TextBox 36"/>
@@ -25958,7 +25958,7 @@
             </p:txBody>
           </p:sp>
         </mc:Choice>
-        <mc:Fallback>
+        <mc:Fallback xmlns="">
           <p:sp>
             <p:nvSpPr>
               <p:cNvPr id="37" name="TextBox 36"/>
@@ -25997,8 +25997,8 @@
           </p:sp>
         </mc:Fallback>
       </mc:AlternateContent>
-      <mc:AlternateContent xmlns:mc="http://schemas.openxmlformats.org/markup-compatibility/2006">
-        <mc:Choice xmlns:a14="http://schemas.microsoft.com/office/drawing/2010/main" Requires="a14">
+      <mc:AlternateContent xmlns:mc="http://schemas.openxmlformats.org/markup-compatibility/2006" xmlns:a14="http://schemas.microsoft.com/office/drawing/2010/main">
+        <mc:Choice Requires="a14">
           <p:sp>
             <p:nvSpPr>
               <p:cNvPr id="35" name="TextBox 34"/>
@@ -26099,7 +26099,7 @@
             </p:txBody>
           </p:sp>
         </mc:Choice>
-        <mc:Fallback>
+        <mc:Fallback xmlns="">
           <p:sp>
             <p:nvSpPr>
               <p:cNvPr id="35" name="TextBox 34"/>
@@ -26264,8 +26264,8 @@
           </a:p>
         </p:txBody>
       </p:sp>
-      <mc:AlternateContent xmlns:mc="http://schemas.openxmlformats.org/markup-compatibility/2006">
-        <mc:Choice xmlns:a14="http://schemas.microsoft.com/office/drawing/2010/main" Requires="a14">
+      <mc:AlternateContent xmlns:mc="http://schemas.openxmlformats.org/markup-compatibility/2006" xmlns:a14="http://schemas.microsoft.com/office/drawing/2010/main">
+        <mc:Choice Requires="a14">
           <p:sp>
             <p:nvSpPr>
               <p:cNvPr id="30" name="TextBox 29">
@@ -26372,7 +26372,7 @@
             </p:txBody>
           </p:sp>
         </mc:Choice>
-        <mc:Fallback>
+        <mc:Fallback xmlns="">
           <p:sp>
             <p:nvSpPr>
               <p:cNvPr id="30" name="TextBox 29">
@@ -27587,8 +27587,8 @@
           </a:p>
         </p:txBody>
       </p:sp>
-      <mc:AlternateContent xmlns:mc="http://schemas.openxmlformats.org/markup-compatibility/2006">
-        <mc:Choice xmlns:a14="http://schemas.microsoft.com/office/drawing/2010/main" Requires="a14">
+      <mc:AlternateContent xmlns:mc="http://schemas.openxmlformats.org/markup-compatibility/2006" xmlns:a14="http://schemas.microsoft.com/office/drawing/2010/main">
+        <mc:Choice Requires="a14">
           <p:sp>
             <p:nvSpPr>
               <p:cNvPr id="26" name="TextBox 25">
@@ -27858,7 +27858,7 @@
             </p:txBody>
           </p:sp>
         </mc:Choice>
-        <mc:Fallback>
+        <mc:Fallback xmlns="">
           <p:sp>
             <p:nvSpPr>
               <p:cNvPr id="26" name="TextBox 25">
@@ -28250,8 +28250,8 @@
           </a:p>
         </p:txBody>
       </p:sp>
-      <mc:AlternateContent xmlns:mc="http://schemas.openxmlformats.org/markup-compatibility/2006">
-        <mc:Choice xmlns:a14="http://schemas.microsoft.com/office/drawing/2010/main" Requires="a14">
+      <mc:AlternateContent xmlns:mc="http://schemas.openxmlformats.org/markup-compatibility/2006" xmlns:a14="http://schemas.microsoft.com/office/drawing/2010/main">
+        <mc:Choice Requires="a14">
           <p:sp>
             <p:nvSpPr>
               <p:cNvPr id="4" name="TextBox 3">
@@ -28371,7 +28371,7 @@
             </p:txBody>
           </p:sp>
         </mc:Choice>
-        <mc:Fallback>
+        <mc:Fallback xmlns="">
           <p:sp>
             <p:nvSpPr>
               <p:cNvPr id="4" name="TextBox 3">
@@ -28416,8 +28416,8 @@
           </p:sp>
         </mc:Fallback>
       </mc:AlternateContent>
-      <mc:AlternateContent xmlns:mc="http://schemas.openxmlformats.org/markup-compatibility/2006">
-        <mc:Choice xmlns:a14="http://schemas.microsoft.com/office/drawing/2010/main" Requires="a14">
+      <mc:AlternateContent xmlns:mc="http://schemas.openxmlformats.org/markup-compatibility/2006" xmlns:a14="http://schemas.microsoft.com/office/drawing/2010/main">
+        <mc:Choice Requires="a14">
           <p:sp>
             <p:nvSpPr>
               <p:cNvPr id="8" name="TextBox 7">
@@ -28500,7 +28500,7 @@
             </p:txBody>
           </p:sp>
         </mc:Choice>
-        <mc:Fallback>
+        <mc:Fallback xmlns="">
           <p:sp>
             <p:nvSpPr>
               <p:cNvPr id="8" name="TextBox 7">
@@ -28545,8 +28545,8 @@
           </p:sp>
         </mc:Fallback>
       </mc:AlternateContent>
-      <mc:AlternateContent xmlns:mc="http://schemas.openxmlformats.org/markup-compatibility/2006">
-        <mc:Choice xmlns:a14="http://schemas.microsoft.com/office/drawing/2010/main" Requires="a14">
+      <mc:AlternateContent xmlns:mc="http://schemas.openxmlformats.org/markup-compatibility/2006" xmlns:a14="http://schemas.microsoft.com/office/drawing/2010/main">
+        <mc:Choice Requires="a14">
           <p:sp>
             <p:nvSpPr>
               <p:cNvPr id="10" name="TextBox 9">
@@ -28639,7 +28639,7 @@
             </p:txBody>
           </p:sp>
         </mc:Choice>
-        <mc:Fallback>
+        <mc:Fallback xmlns="">
           <p:sp>
             <p:nvSpPr>
               <p:cNvPr id="10" name="TextBox 9">
@@ -28684,8 +28684,8 @@
           </p:sp>
         </mc:Fallback>
       </mc:AlternateContent>
-      <mc:AlternateContent xmlns:mc="http://schemas.openxmlformats.org/markup-compatibility/2006">
-        <mc:Choice xmlns:a14="http://schemas.microsoft.com/office/drawing/2010/main" Requires="a14">
+      <mc:AlternateContent xmlns:mc="http://schemas.openxmlformats.org/markup-compatibility/2006" xmlns:a14="http://schemas.microsoft.com/office/drawing/2010/main">
+        <mc:Choice Requires="a14">
           <p:sp>
             <p:nvSpPr>
               <p:cNvPr id="11" name="TextBox 10">
@@ -28768,7 +28768,7 @@
             </p:txBody>
           </p:sp>
         </mc:Choice>
-        <mc:Fallback>
+        <mc:Fallback xmlns="">
           <p:sp>
             <p:nvSpPr>
               <p:cNvPr id="11" name="TextBox 10">
@@ -28813,8 +28813,8 @@
           </p:sp>
         </mc:Fallback>
       </mc:AlternateContent>
-      <mc:AlternateContent xmlns:mc="http://schemas.openxmlformats.org/markup-compatibility/2006">
-        <mc:Choice xmlns:a14="http://schemas.microsoft.com/office/drawing/2010/main" Requires="a14">
+      <mc:AlternateContent xmlns:mc="http://schemas.openxmlformats.org/markup-compatibility/2006" xmlns:a14="http://schemas.microsoft.com/office/drawing/2010/main">
+        <mc:Choice Requires="a14">
           <p:sp>
             <p:nvSpPr>
               <p:cNvPr id="13" name="TextBox 12">
@@ -28897,7 +28897,7 @@
             </p:txBody>
           </p:sp>
         </mc:Choice>
-        <mc:Fallback>
+        <mc:Fallback xmlns="">
           <p:sp>
             <p:nvSpPr>
               <p:cNvPr id="13" name="TextBox 12">
@@ -28942,8 +28942,8 @@
           </p:sp>
         </mc:Fallback>
       </mc:AlternateContent>
-      <mc:AlternateContent xmlns:mc="http://schemas.openxmlformats.org/markup-compatibility/2006">
-        <mc:Choice xmlns:a14="http://schemas.microsoft.com/office/drawing/2010/main" Requires="a14">
+      <mc:AlternateContent xmlns:mc="http://schemas.openxmlformats.org/markup-compatibility/2006" xmlns:a14="http://schemas.microsoft.com/office/drawing/2010/main">
+        <mc:Choice Requires="a14">
           <p:sp>
             <p:nvSpPr>
               <p:cNvPr id="6" name="TextBox 5">
@@ -29102,7 +29102,7 @@
             </p:txBody>
           </p:sp>
         </mc:Choice>
-        <mc:Fallback>
+        <mc:Fallback xmlns="">
           <p:sp>
             <p:nvSpPr>
               <p:cNvPr id="6" name="TextBox 5">
@@ -29147,8 +29147,8 @@
           </p:sp>
         </mc:Fallback>
       </mc:AlternateContent>
-      <mc:AlternateContent xmlns:mc="http://schemas.openxmlformats.org/markup-compatibility/2006">
-        <mc:Choice xmlns:a14="http://schemas.microsoft.com/office/drawing/2010/main" Requires="a14">
+      <mc:AlternateContent xmlns:mc="http://schemas.openxmlformats.org/markup-compatibility/2006" xmlns:a14="http://schemas.microsoft.com/office/drawing/2010/main">
+        <mc:Choice Requires="a14">
           <p:sp>
             <p:nvSpPr>
               <p:cNvPr id="14" name="TextBox 13">
@@ -29328,7 +29328,7 @@
             </p:txBody>
           </p:sp>
         </mc:Choice>
-        <mc:Fallback>
+        <mc:Fallback xmlns="">
           <p:sp>
             <p:nvSpPr>
               <p:cNvPr id="14" name="TextBox 13">
@@ -29463,8 +29463,8 @@
           </a:p>
         </p:txBody>
       </p:sp>
-      <mc:AlternateContent xmlns:mc="http://schemas.openxmlformats.org/markup-compatibility/2006">
-        <mc:Choice xmlns:a14="http://schemas.microsoft.com/office/drawing/2010/main" Requires="a14">
+      <mc:AlternateContent xmlns:mc="http://schemas.openxmlformats.org/markup-compatibility/2006" xmlns:a14="http://schemas.microsoft.com/office/drawing/2010/main">
+        <mc:Choice Requires="a14">
           <p:sp>
             <p:nvSpPr>
               <p:cNvPr id="18" name="TextBox 17">
@@ -29548,7 +29548,7 @@
             </p:txBody>
           </p:sp>
         </mc:Choice>
-        <mc:Fallback>
+        <mc:Fallback xmlns="">
           <p:sp>
             <p:nvSpPr>
               <p:cNvPr id="18" name="TextBox 17">
@@ -29593,8 +29593,8 @@
           </p:sp>
         </mc:Fallback>
       </mc:AlternateContent>
-      <mc:AlternateContent xmlns:mc="http://schemas.openxmlformats.org/markup-compatibility/2006">
-        <mc:Choice xmlns:a14="http://schemas.microsoft.com/office/drawing/2010/main" Requires="a14">
+      <mc:AlternateContent xmlns:mc="http://schemas.openxmlformats.org/markup-compatibility/2006" xmlns:a14="http://schemas.microsoft.com/office/drawing/2010/main">
+        <mc:Choice Requires="a14">
           <p:sp>
             <p:nvSpPr>
               <p:cNvPr id="19" name="TextBox 18">
@@ -29718,7 +29718,7 @@
             </p:txBody>
           </p:sp>
         </mc:Choice>
-        <mc:Fallback>
+        <mc:Fallback xmlns="">
           <p:sp>
             <p:nvSpPr>
               <p:cNvPr id="19" name="TextBox 18">
@@ -29763,8 +29763,8 @@
           </p:sp>
         </mc:Fallback>
       </mc:AlternateContent>
-      <mc:AlternateContent xmlns:mc="http://schemas.openxmlformats.org/markup-compatibility/2006">
-        <mc:Choice xmlns:a14="http://schemas.microsoft.com/office/drawing/2010/main" Requires="a14">
+      <mc:AlternateContent xmlns:mc="http://schemas.openxmlformats.org/markup-compatibility/2006" xmlns:a14="http://schemas.microsoft.com/office/drawing/2010/main">
+        <mc:Choice Requires="a14">
           <p:sp>
             <p:nvSpPr>
               <p:cNvPr id="20" name="TextBox 19">
@@ -29965,7 +29965,7 @@
             </p:txBody>
           </p:sp>
         </mc:Choice>
-        <mc:Fallback>
+        <mc:Fallback xmlns="">
           <p:sp>
             <p:nvSpPr>
               <p:cNvPr id="20" name="TextBox 19">
@@ -31147,8 +31147,8 @@
           </a:p>
         </p:txBody>
       </p:sp>
-      <mc:AlternateContent xmlns:mc="http://schemas.openxmlformats.org/markup-compatibility/2006">
-        <mc:Choice xmlns:a14="http://schemas.microsoft.com/office/drawing/2010/main" Requires="a14">
+      <mc:AlternateContent xmlns:mc="http://schemas.openxmlformats.org/markup-compatibility/2006" xmlns:a14="http://schemas.microsoft.com/office/drawing/2010/main">
+        <mc:Choice Requires="a14">
           <p:sp>
             <p:nvSpPr>
               <p:cNvPr id="8194" name="Rectangle 3">
@@ -31316,7 +31316,7 @@
             </p:txBody>
           </p:sp>
         </mc:Choice>
-        <mc:Fallback>
+        <mc:Fallback xmlns="">
           <p:sp>
             <p:nvSpPr>
               <p:cNvPr id="8194" name="Rectangle 3">
@@ -31332,7 +31332,7 @@
               <p:nvPr>
                 <p:ph type="body" idx="1"/>
                 <p:custDataLst>
-                  <p:tags r:id="rId2"/>
+                  <p:tags r:id="rId5"/>
                 </p:custDataLst>
               </p:nvPr>
             </p:nvSpPr>
@@ -31342,7 +31342,7 @@
                 <a:ext cx="8255000" cy="4953000"/>
               </a:xfrm>
               <a:blipFill>
-                <a:blip r:embed="rId5"/>
+                <a:blip r:embed="rId6"/>
                 <a:stretch>
                   <a:fillRect l="-1536" t="-1790" r="-307"/>
                 </a:stretch>
@@ -35350,7 +35350,7 @@
             </a:extLst>
           </p:cNvPr>
           <p:cNvSpPr>
-            <a:spLocks noChangeArrowheads="1"/>
+            <a:spLocks noGrp="1" noChangeArrowheads="1"/>
           </p:cNvSpPr>
           <p:nvPr>
             <p:ph type="body" idx="1"/>

</xml_diff>